<commit_message>
add image to show the flow
</commit_message>
<xml_diff>
--- a/现代软工.pptx
+++ b/现代软工.pptx
@@ -104,6 +104,11 @@
       </a:defRPr>
     </a:lvl9pPr>
   </p:defaultTextStyle>
+  <p:extLst>
+    <p:ext uri="{EFAFB233-063F-42B5-8137-9DF3F51BA10A}">
+      <p15:sldGuideLst xmlns:p15="http://schemas.microsoft.com/office/powerpoint/2012/main"/>
+    </p:ext>
+  </p:extLst>
 </p:presentation>
 </file>
 
@@ -3029,7 +3034,7 @@
         </p:nvSpPr>
         <p:spPr>
           <a:xfrm>
-            <a:off x="609600" y="1497874"/>
+            <a:off x="707457" y="1332411"/>
             <a:ext cx="11033760" cy="2446824"/>
           </a:xfrm>
           <a:prstGeom prst="rect">
@@ -3178,7 +3183,7 @@
               </a:spcAft>
             </a:pPr>
             <a:r>
-              <a:rPr lang="en-US" altLang="zh-CN" smtClean="0">
+              <a:rPr lang="en-US" altLang="zh-CN" dirty="0" smtClean="0">
                 <a:latin typeface="楷体" panose="02010609060101010101" pitchFamily="49" charset="-122"/>
                 <a:ea typeface="楷体" panose="02010609060101010101" pitchFamily="49" charset="-122"/>
               </a:rPr>
@@ -3215,6 +3220,30 @@
           </a:p>
         </p:txBody>
       </p:sp>
+      <p:pic>
+        <p:nvPicPr>
+          <p:cNvPr id="2" name="图片 1"/>
+          <p:cNvPicPr>
+            <a:picLocks noChangeAspect="1"/>
+          </p:cNvPicPr>
+          <p:nvPr/>
+        </p:nvPicPr>
+        <p:blipFill>
+          <a:blip r:embed="rId2"/>
+          <a:stretch>
+            <a:fillRect/>
+          </a:stretch>
+        </p:blipFill>
+        <p:spPr>
+          <a:xfrm>
+            <a:off x="2412274" y="3505278"/>
+            <a:ext cx="7384868" cy="3120072"/>
+          </a:xfrm>
+          <a:prstGeom prst="rect">
+            <a:avLst/>
+          </a:prstGeom>
+        </p:spPr>
+      </p:pic>
     </p:spTree>
     <p:extLst>
       <p:ext uri="{BB962C8B-B14F-4D97-AF65-F5344CB8AC3E}">

</xml_diff>